<commit_message>
Add javadoc, fix test file content
</commit_message>
<xml_diff>
--- a/src/test/resources/com/opensearchserver/textextractor/test/file.pptx
+++ b/src/test/resources/com/opensearchserver/textextractor/test/file.pptx
@@ -288,7 +288,7 @@
           <a:p>
             <a:fld id="{88C0933A-95F2-9A47-8853-A4EEC60937A3}" type="datetimeFigureOut">
               <a:rPr lang="fr-FR" smtClean="0"/>
-              <a:t>10/11/14</a:t>
+              <a:t>11/11/14</a:t>
             </a:fld>
             <a:endParaRPr lang="en-US"/>
           </a:p>
@@ -458,7 +458,7 @@
           <a:p>
             <a:fld id="{88C0933A-95F2-9A47-8853-A4EEC60937A3}" type="datetimeFigureOut">
               <a:rPr lang="fr-FR" smtClean="0"/>
-              <a:t>10/11/14</a:t>
+              <a:t>11/11/14</a:t>
             </a:fld>
             <a:endParaRPr lang="en-US"/>
           </a:p>
@@ -638,7 +638,7 @@
           <a:p>
             <a:fld id="{88C0933A-95F2-9A47-8853-A4EEC60937A3}" type="datetimeFigureOut">
               <a:rPr lang="fr-FR" smtClean="0"/>
-              <a:t>10/11/14</a:t>
+              <a:t>11/11/14</a:t>
             </a:fld>
             <a:endParaRPr lang="en-US"/>
           </a:p>
@@ -808,7 +808,7 @@
           <a:p>
             <a:fld id="{88C0933A-95F2-9A47-8853-A4EEC60937A3}" type="datetimeFigureOut">
               <a:rPr lang="fr-FR" smtClean="0"/>
-              <a:t>10/11/14</a:t>
+              <a:t>11/11/14</a:t>
             </a:fld>
             <a:endParaRPr lang="en-US"/>
           </a:p>
@@ -1054,7 +1054,7 @@
           <a:p>
             <a:fld id="{88C0933A-95F2-9A47-8853-A4EEC60937A3}" type="datetimeFigureOut">
               <a:rPr lang="fr-FR" smtClean="0"/>
-              <a:t>10/11/14</a:t>
+              <a:t>11/11/14</a:t>
             </a:fld>
             <a:endParaRPr lang="en-US"/>
           </a:p>
@@ -1342,7 +1342,7 @@
           <a:p>
             <a:fld id="{88C0933A-95F2-9A47-8853-A4EEC60937A3}" type="datetimeFigureOut">
               <a:rPr lang="fr-FR" smtClean="0"/>
-              <a:t>10/11/14</a:t>
+              <a:t>11/11/14</a:t>
             </a:fld>
             <a:endParaRPr lang="en-US"/>
           </a:p>
@@ -1764,7 +1764,7 @@
           <a:p>
             <a:fld id="{88C0933A-95F2-9A47-8853-A4EEC60937A3}" type="datetimeFigureOut">
               <a:rPr lang="fr-FR" smtClean="0"/>
-              <a:t>10/11/14</a:t>
+              <a:t>11/11/14</a:t>
             </a:fld>
             <a:endParaRPr lang="en-US"/>
           </a:p>
@@ -1882,7 +1882,7 @@
           <a:p>
             <a:fld id="{88C0933A-95F2-9A47-8853-A4EEC60937A3}" type="datetimeFigureOut">
               <a:rPr lang="fr-FR" smtClean="0"/>
-              <a:t>10/11/14</a:t>
+              <a:t>11/11/14</a:t>
             </a:fld>
             <a:endParaRPr lang="en-US"/>
           </a:p>
@@ -1977,7 +1977,7 @@
           <a:p>
             <a:fld id="{88C0933A-95F2-9A47-8853-A4EEC60937A3}" type="datetimeFigureOut">
               <a:rPr lang="fr-FR" smtClean="0"/>
-              <a:t>10/11/14</a:t>
+              <a:t>11/11/14</a:t>
             </a:fld>
             <a:endParaRPr lang="en-US"/>
           </a:p>
@@ -2254,7 +2254,7 @@
           <a:p>
             <a:fld id="{88C0933A-95F2-9A47-8853-A4EEC60937A3}" type="datetimeFigureOut">
               <a:rPr lang="fr-FR" smtClean="0"/>
-              <a:t>10/11/14</a:t>
+              <a:t>11/11/14</a:t>
             </a:fld>
             <a:endParaRPr lang="en-US"/>
           </a:p>
@@ -2507,7 +2507,7 @@
           <a:p>
             <a:fld id="{88C0933A-95F2-9A47-8853-A4EEC60937A3}" type="datetimeFigureOut">
               <a:rPr lang="fr-FR" smtClean="0"/>
-              <a:t>10/11/14</a:t>
+              <a:t>11/11/14</a:t>
             </a:fld>
             <a:endParaRPr lang="en-US"/>
           </a:p>
@@ -2720,7 +2720,7 @@
           <a:p>
             <a:fld id="{88C0933A-95F2-9A47-8853-A4EEC60937A3}" type="datetimeFigureOut">
               <a:rPr lang="fr-FR" smtClean="0"/>
-              <a:t>10/11/14</a:t>
+              <a:t>11/11/14</a:t>
             </a:fld>
             <a:endParaRPr lang="en-US"/>
           </a:p>
@@ -3134,16 +3134,12 @@
           <a:lstStyle/>
           <a:p>
             <a:r>
-              <a:rPr lang="en-US" dirty="0" err="1"/>
-              <a:t>p</a:t>
-            </a:r>
-            <a:r>
-              <a:rPr lang="en-US" dirty="0" err="1" smtClean="0"/>
-              <a:t>pt</a:t>
+              <a:rPr lang="en-US" smtClean="0"/>
+              <a:t>pptx </a:t>
             </a:r>
             <a:r>
               <a:rPr lang="en-US" dirty="0" smtClean="0"/>
-              <a:t> parser</a:t>
+              <a:t>parser</a:t>
             </a:r>
             <a:endParaRPr lang="en-US" dirty="0"/>
           </a:p>

</xml_diff>